<commit_message>
Adds video for slides.pptx (Only visible on Google Slides)
</commit_message>
<xml_diff>
--- a/assets/slides.pptx
+++ b/assets/slides.pptx
@@ -23,21 +23,20 @@
     <p:sldId id="267" r:id="rId18"/>
     <p:sldId id="268" r:id="rId19"/>
     <p:sldId id="269" r:id="rId20"/>
-    <p:sldId id="270" r:id="rId21"/>
   </p:sldIdLst>
   <p:sldSz cy="5143500" cx="9144000"/>
   <p:notesSz cx="6858000" cy="9144000"/>
   <p:embeddedFontLst>
     <p:embeddedFont>
       <p:font typeface="Audiowide"/>
-      <p:regular r:id="rId22"/>
+      <p:regular r:id="rId21"/>
     </p:embeddedFont>
     <p:embeddedFont>
       <p:font typeface="Roboto"/>
-      <p:regular r:id="rId23"/>
-      <p:bold r:id="rId24"/>
-      <p:italic r:id="rId25"/>
-      <p:boldItalic r:id="rId26"/>
+      <p:regular r:id="rId22"/>
+      <p:bold r:id="rId23"/>
+      <p:italic r:id="rId24"/>
+      <p:boldItalic r:id="rId25"/>
     </p:embeddedFont>
   </p:embeddedFontLst>
   <p:defaultTextStyle>
@@ -836,7 +835,7 @@
   <p:cSld>
     <p:spTree>
       <p:nvGrpSpPr>
-        <p:cNvPr id="167" name="Shape 167"/>
+        <p:cNvPr id="168" name="Shape 168"/>
         <p:cNvGrpSpPr/>
         <p:nvPr/>
       </p:nvGrpSpPr>
@@ -850,7 +849,7 @@
       </p:grpSpPr>
       <p:sp>
         <p:nvSpPr>
-          <p:cNvPr id="168" name="Google Shape;168;g317332e5e24_0_54:notes"/>
+          <p:cNvPr id="169" name="Google Shape;169;g317332e5e24_0_54:notes"/>
           <p:cNvSpPr/>
           <p:nvPr>
             <p:ph idx="2" type="sldImg"/>
@@ -895,7 +894,7 @@
       </p:sp>
       <p:sp>
         <p:nvSpPr>
-          <p:cNvPr id="169" name="Google Shape;169;g317332e5e24_0_54:notes"/>
+          <p:cNvPr id="170" name="Google Shape;170;g317332e5e24_0_54:notes"/>
           <p:cNvSpPr txBox="1"/>
           <p:nvPr>
             <p:ph idx="1" type="body"/>
@@ -953,7 +952,7 @@
   <p:cSld>
     <p:spTree>
       <p:nvGrpSpPr>
-        <p:cNvPr id="176" name="Shape 176"/>
+        <p:cNvPr id="177" name="Shape 177"/>
         <p:cNvGrpSpPr/>
         <p:nvPr/>
       </p:nvGrpSpPr>
@@ -967,7 +966,7 @@
       </p:grpSpPr>
       <p:sp>
         <p:nvSpPr>
-          <p:cNvPr id="177" name="Google Shape;177;g317332e5e24_0_70:notes"/>
+          <p:cNvPr id="178" name="Google Shape;178;g317332e5e24_0_70:notes"/>
           <p:cNvSpPr/>
           <p:nvPr>
             <p:ph idx="2" type="sldImg"/>
@@ -1012,7 +1011,7 @@
       </p:sp>
       <p:sp>
         <p:nvSpPr>
-          <p:cNvPr id="178" name="Google Shape;178;g317332e5e24_0_70:notes"/>
+          <p:cNvPr id="179" name="Google Shape;179;g317332e5e24_0_70:notes"/>
           <p:cNvSpPr txBox="1"/>
           <p:nvPr>
             <p:ph idx="1" type="body"/>
@@ -1070,7 +1069,7 @@
   <p:cSld>
     <p:spTree>
       <p:nvGrpSpPr>
-        <p:cNvPr id="185" name="Shape 185"/>
+        <p:cNvPr id="186" name="Shape 186"/>
         <p:cNvGrpSpPr/>
         <p:nvPr/>
       </p:nvGrpSpPr>
@@ -1084,7 +1083,7 @@
       </p:grpSpPr>
       <p:sp>
         <p:nvSpPr>
-          <p:cNvPr id="186" name="Google Shape;186;g317332e5e24_0_62:notes"/>
+          <p:cNvPr id="187" name="Google Shape;187;g317332e5e24_0_62:notes"/>
           <p:cNvSpPr/>
           <p:nvPr>
             <p:ph idx="2" type="sldImg"/>
@@ -1129,7 +1128,7 @@
       </p:sp>
       <p:sp>
         <p:nvSpPr>
-          <p:cNvPr id="187" name="Google Shape;187;g317332e5e24_0_62:notes"/>
+          <p:cNvPr id="188" name="Google Shape;188;g317332e5e24_0_62:notes"/>
           <p:cNvSpPr txBox="1"/>
           <p:nvPr>
             <p:ph idx="1" type="body"/>
@@ -1187,7 +1186,7 @@
   <p:cSld>
     <p:spTree>
       <p:nvGrpSpPr>
-        <p:cNvPr id="194" name="Shape 194"/>
+        <p:cNvPr id="195" name="Shape 195"/>
         <p:cNvGrpSpPr/>
         <p:nvPr/>
       </p:nvGrpSpPr>
@@ -1201,7 +1200,7 @@
       </p:grpSpPr>
       <p:sp>
         <p:nvSpPr>
-          <p:cNvPr id="195" name="Google Shape;195;g317332e5e24_2_59:notes"/>
+          <p:cNvPr id="196" name="Google Shape;196;g317332e5e24_0_78:notes"/>
           <p:cNvSpPr/>
           <p:nvPr>
             <p:ph idx="2" type="sldImg"/>
@@ -1246,7 +1245,7 @@
       </p:sp>
       <p:sp>
         <p:nvSpPr>
-          <p:cNvPr id="196" name="Google Shape;196;g317332e5e24_2_59:notes"/>
+          <p:cNvPr id="197" name="Google Shape;197;g317332e5e24_0_78:notes"/>
           <p:cNvSpPr txBox="1"/>
           <p:nvPr>
             <p:ph idx="1" type="body"/>
@@ -1304,7 +1303,7 @@
   <p:cSld>
     <p:spTree>
       <p:nvGrpSpPr>
-        <p:cNvPr id="204" name="Shape 204"/>
+        <p:cNvPr id="201" name="Shape 201"/>
         <p:cNvGrpSpPr/>
         <p:nvPr/>
       </p:nvGrpSpPr>
@@ -1318,7 +1317,7 @@
       </p:grpSpPr>
       <p:sp>
         <p:nvSpPr>
-          <p:cNvPr id="205" name="Google Shape;205;g317332e5e24_0_78:notes"/>
+          <p:cNvPr id="202" name="Google Shape;202;g317332e5e24_2_145:notes"/>
           <p:cNvSpPr/>
           <p:nvPr>
             <p:ph idx="2" type="sldImg"/>
@@ -1363,124 +1362,7 @@
       </p:sp>
       <p:sp>
         <p:nvSpPr>
-          <p:cNvPr id="206" name="Google Shape;206;g317332e5e24_0_78:notes"/>
-          <p:cNvSpPr txBox="1"/>
-          <p:nvPr>
-            <p:ph idx="1" type="body"/>
-          </p:nvPr>
-        </p:nvSpPr>
-        <p:spPr>
-          <a:xfrm>
-            <a:off x="685800" y="4343400"/>
-            <a:ext cx="5486400" cy="4114800"/>
-          </a:xfrm>
-          <a:prstGeom prst="rect">
-            <a:avLst/>
-          </a:prstGeom>
-          <a:noFill/>
-          <a:ln>
-            <a:noFill/>
-          </a:ln>
-        </p:spPr>
-        <p:txBody>
-          <a:bodyPr anchorCtr="0" anchor="t" bIns="91425" lIns="91425" spcFirstLastPara="1" rIns="91425" wrap="square" tIns="91425">
-            <a:noAutofit/>
-          </a:bodyPr>
-          <a:lstStyle/>
-          <a:p>
-            <a:pPr indent="0" lvl="0" marL="0" rtl="0" algn="l">
-              <a:lnSpc>
-                <a:spcPct val="100000"/>
-              </a:lnSpc>
-              <a:spcBef>
-                <a:spcPts val="0"/>
-              </a:spcBef>
-              <a:spcAft>
-                <a:spcPts val="0"/>
-              </a:spcAft>
-              <a:buSzPts val="1100"/>
-              <a:buNone/>
-            </a:pPr>
-            <a:r>
-              <a:t/>
-            </a:r>
-            <a:endParaRPr/>
-          </a:p>
-        </p:txBody>
-      </p:sp>
-    </p:spTree>
-  </p:cSld>
-  <p:clrMapOvr>
-    <a:masterClrMapping/>
-  </p:clrMapOvr>
-</p:notes>
-</file>
-
-<file path=ppt/notesSlides/notesSlide15.xml><?xml version="1.0" encoding="utf-8"?>
-<p:notes xmlns:a="http://schemas.openxmlformats.org/drawingml/2006/main" xmlns:r="http://schemas.openxmlformats.org/officeDocument/2006/relationships" xmlns:mc="http://schemas.openxmlformats.org/markup-compatibility/2006" xmlns:mv="urn:schemas-microsoft-com:mac:vml" xmlns:p="http://schemas.openxmlformats.org/presentationml/2006/main" xmlns:c="http://schemas.openxmlformats.org/drawingml/2006/chart" xmlns:dgm="http://schemas.openxmlformats.org/drawingml/2006/diagram" xmlns:o="urn:schemas-microsoft-com:office:office" xmlns:v="urn:schemas-microsoft-com:vml" xmlns:pvml="urn:schemas-microsoft-com:office:powerpoint" xmlns:com="http://schemas.openxmlformats.org/drawingml/2006/compatibility" xmlns:p14="http://schemas.microsoft.com/office/powerpoint/2010/main" xmlns:p15="http://schemas.microsoft.com/office/powerpoint/2012/main" xmlns:ahyp="http://schemas.microsoft.com/office/drawing/2018/hyperlinkcolor" showMasterPhAnim="0" showMasterSp="0">
-  <p:cSld>
-    <p:spTree>
-      <p:nvGrpSpPr>
-        <p:cNvPr id="210" name="Shape 210"/>
-        <p:cNvGrpSpPr/>
-        <p:nvPr/>
-      </p:nvGrpSpPr>
-      <p:grpSpPr>
-        <a:xfrm>
-          <a:off x="0" y="0"/>
-          <a:ext cx="0" cy="0"/>
-          <a:chOff x="0" y="0"/>
-          <a:chExt cx="0" cy="0"/>
-        </a:xfrm>
-      </p:grpSpPr>
-      <p:sp>
-        <p:nvSpPr>
-          <p:cNvPr id="211" name="Google Shape;211;g317332e5e24_2_145:notes"/>
-          <p:cNvSpPr/>
-          <p:nvPr>
-            <p:ph idx="2" type="sldImg"/>
-          </p:nvPr>
-        </p:nvSpPr>
-        <p:spPr>
-          <a:xfrm>
-            <a:off x="381300" y="685800"/>
-            <a:ext cx="6096000" cy="3429000"/>
-          </a:xfrm>
-          <a:custGeom>
-            <a:rect b="b" l="l" r="r" t="t"/>
-            <a:pathLst>
-              <a:path extrusionOk="0" h="120000" w="120000">
-                <a:moveTo>
-                  <a:pt x="0" y="0"/>
-                </a:moveTo>
-                <a:lnTo>
-                  <a:pt x="120000" y="0"/>
-                </a:lnTo>
-                <a:lnTo>
-                  <a:pt x="120000" y="120000"/>
-                </a:lnTo>
-                <a:lnTo>
-                  <a:pt x="0" y="120000"/>
-                </a:lnTo>
-                <a:close/>
-              </a:path>
-            </a:pathLst>
-          </a:custGeom>
-          <a:noFill/>
-          <a:ln cap="flat" cmpd="sng" w="9525">
-            <a:solidFill>
-              <a:srgbClr val="000000"/>
-            </a:solidFill>
-            <a:prstDash val="solid"/>
-            <a:round/>
-            <a:headEnd len="sm" w="sm" type="none"/>
-            <a:tailEnd len="sm" w="sm" type="none"/>
-          </a:ln>
-        </p:spPr>
-      </p:sp>
-      <p:sp>
-        <p:nvSpPr>
-          <p:cNvPr id="212" name="Google Shape;212;g317332e5e24_2_145:notes"/>
+          <p:cNvPr id="203" name="Google Shape;203;g317332e5e24_2_145:notes"/>
           <p:cNvSpPr txBox="1"/>
           <p:nvPr>
             <p:ph idx="1" type="body"/>
@@ -2417,7 +2299,7 @@
   <p:cSld>
     <p:spTree>
       <p:nvGrpSpPr>
-        <p:cNvPr id="159" name="Shape 159"/>
+        <p:cNvPr id="160" name="Shape 160"/>
         <p:cNvGrpSpPr/>
         <p:nvPr/>
       </p:nvGrpSpPr>
@@ -2431,7 +2313,7 @@
       </p:grpSpPr>
       <p:sp>
         <p:nvSpPr>
-          <p:cNvPr id="160" name="Google Shape;160;g317332e5e24_0_46:notes"/>
+          <p:cNvPr id="161" name="Google Shape;161;g317332e5e24_0_46:notes"/>
           <p:cNvSpPr/>
           <p:nvPr>
             <p:ph idx="2" type="sldImg"/>
@@ -2476,7 +2358,7 @@
       </p:sp>
       <p:sp>
         <p:nvSpPr>
-          <p:cNvPr id="161" name="Google Shape;161;g317332e5e24_0_46:notes"/>
+          <p:cNvPr id="162" name="Google Shape;162;g317332e5e24_0_46:notes"/>
           <p:cNvSpPr txBox="1"/>
           <p:nvPr>
             <p:ph idx="1" type="body"/>
@@ -15208,7 +15090,7 @@
   <p:cSld>
     <p:spTree>
       <p:nvGrpSpPr>
-        <p:cNvPr id="170" name="Shape 170"/>
+        <p:cNvPr id="171" name="Shape 171"/>
         <p:cNvGrpSpPr/>
         <p:nvPr/>
       </p:nvGrpSpPr>
@@ -15222,7 +15104,7 @@
       </p:grpSpPr>
       <p:sp>
         <p:nvSpPr>
-          <p:cNvPr id="171" name="Google Shape;171;p34"/>
+          <p:cNvPr id="172" name="Google Shape;172;p34"/>
           <p:cNvSpPr txBox="1"/>
           <p:nvPr>
             <p:ph type="title"/>
@@ -15286,7 +15168,7 @@
       </p:sp>
       <p:sp>
         <p:nvSpPr>
-          <p:cNvPr id="172" name="Google Shape;172;p34"/>
+          <p:cNvPr id="173" name="Google Shape;173;p34"/>
           <p:cNvSpPr/>
           <p:nvPr/>
         </p:nvSpPr>
@@ -15351,7 +15233,7 @@
       </p:sp>
       <p:sp>
         <p:nvSpPr>
-          <p:cNvPr id="173" name="Google Shape;173;p34"/>
+          <p:cNvPr id="174" name="Google Shape;174;p34"/>
           <p:cNvSpPr txBox="1"/>
           <p:nvPr/>
         </p:nvSpPr>
@@ -15412,7 +15294,7 @@
       </p:sp>
       <p:pic>
         <p:nvPicPr>
-          <p:cNvPr id="174" name="Google Shape;174;p34"/>
+          <p:cNvPr id="175" name="Google Shape;175;p34"/>
           <p:cNvPicPr preferRelativeResize="0"/>
           <p:nvPr/>
         </p:nvPicPr>
@@ -15448,7 +15330,7 @@
       </p:pic>
       <p:sp>
         <p:nvSpPr>
-          <p:cNvPr id="175" name="Google Shape;175;p34"/>
+          <p:cNvPr id="176" name="Google Shape;176;p34"/>
           <p:cNvSpPr/>
           <p:nvPr/>
         </p:nvSpPr>
@@ -15506,7 +15388,7 @@
   <p:cSld>
     <p:spTree>
       <p:nvGrpSpPr>
-        <p:cNvPr id="179" name="Shape 179"/>
+        <p:cNvPr id="180" name="Shape 180"/>
         <p:cNvGrpSpPr/>
         <p:nvPr/>
       </p:nvGrpSpPr>
@@ -15520,7 +15402,7 @@
       </p:grpSpPr>
       <p:sp>
         <p:nvSpPr>
-          <p:cNvPr id="180" name="Google Shape;180;p35"/>
+          <p:cNvPr id="181" name="Google Shape;181;p35"/>
           <p:cNvSpPr txBox="1"/>
           <p:nvPr>
             <p:ph type="title"/>
@@ -15584,7 +15466,7 @@
       </p:sp>
       <p:sp>
         <p:nvSpPr>
-          <p:cNvPr id="181" name="Google Shape;181;p35"/>
+          <p:cNvPr id="182" name="Google Shape;182;p35"/>
           <p:cNvSpPr/>
           <p:nvPr/>
         </p:nvSpPr>
@@ -15649,7 +15531,7 @@
       </p:sp>
       <p:sp>
         <p:nvSpPr>
-          <p:cNvPr id="182" name="Google Shape;182;p35"/>
+          <p:cNvPr id="183" name="Google Shape;183;p35"/>
           <p:cNvSpPr txBox="1"/>
           <p:nvPr/>
         </p:nvSpPr>
@@ -15722,7 +15604,7 @@
       </p:sp>
       <p:pic>
         <p:nvPicPr>
-          <p:cNvPr id="183" name="Google Shape;183;p35"/>
+          <p:cNvPr id="184" name="Google Shape;184;p35"/>
           <p:cNvPicPr preferRelativeResize="0"/>
           <p:nvPr/>
         </p:nvPicPr>
@@ -15758,7 +15640,7 @@
       </p:pic>
       <p:sp>
         <p:nvSpPr>
-          <p:cNvPr id="184" name="Google Shape;184;p35"/>
+          <p:cNvPr id="185" name="Google Shape;185;p35"/>
           <p:cNvSpPr/>
           <p:nvPr/>
         </p:nvSpPr>
@@ -15816,7 +15698,7 @@
   <p:cSld>
     <p:spTree>
       <p:nvGrpSpPr>
-        <p:cNvPr id="188" name="Shape 188"/>
+        <p:cNvPr id="189" name="Shape 189"/>
         <p:cNvGrpSpPr/>
         <p:nvPr/>
       </p:nvGrpSpPr>
@@ -15830,7 +15712,7 @@
       </p:grpSpPr>
       <p:sp>
         <p:nvSpPr>
-          <p:cNvPr id="189" name="Google Shape;189;p36"/>
+          <p:cNvPr id="190" name="Google Shape;190;p36"/>
           <p:cNvSpPr txBox="1"/>
           <p:nvPr>
             <p:ph type="title"/>
@@ -15894,7 +15776,7 @@
       </p:sp>
       <p:sp>
         <p:nvSpPr>
-          <p:cNvPr id="190" name="Google Shape;190;p36"/>
+          <p:cNvPr id="191" name="Google Shape;191;p36"/>
           <p:cNvSpPr/>
           <p:nvPr/>
         </p:nvSpPr>
@@ -15959,7 +15841,7 @@
       </p:sp>
       <p:sp>
         <p:nvSpPr>
-          <p:cNvPr id="191" name="Google Shape;191;p36"/>
+          <p:cNvPr id="192" name="Google Shape;192;p36"/>
           <p:cNvSpPr txBox="1"/>
           <p:nvPr/>
         </p:nvSpPr>
@@ -16126,7 +16008,7 @@
       </p:sp>
       <p:pic>
         <p:nvPicPr>
-          <p:cNvPr id="192" name="Google Shape;192;p36"/>
+          <p:cNvPr id="193" name="Google Shape;193;p36"/>
           <p:cNvPicPr preferRelativeResize="0"/>
           <p:nvPr/>
         </p:nvPicPr>
@@ -16162,7 +16044,7 @@
       </p:pic>
       <p:sp>
         <p:nvSpPr>
-          <p:cNvPr id="193" name="Google Shape;193;p36"/>
+          <p:cNvPr id="194" name="Google Shape;194;p36"/>
           <p:cNvSpPr/>
           <p:nvPr/>
         </p:nvSpPr>
@@ -16216,11 +16098,11 @@
 </file>
 
 <file path=ppt/slides/slide13.xml><?xml version="1.0" encoding="utf-8"?>
-<p:sld xmlns:a="http://schemas.openxmlformats.org/drawingml/2006/main" xmlns:r="http://schemas.openxmlformats.org/officeDocument/2006/relationships" xmlns:mc="http://schemas.openxmlformats.org/markup-compatibility/2006" xmlns:mv="urn:schemas-microsoft-com:mac:vml" xmlns:p="http://schemas.openxmlformats.org/presentationml/2006/main" xmlns:c="http://schemas.openxmlformats.org/drawingml/2006/chart" xmlns:dgm="http://schemas.openxmlformats.org/drawingml/2006/diagram" xmlns:o="urn:schemas-microsoft-com:office:office" xmlns:v="urn:schemas-microsoft-com:vml" xmlns:pvml="urn:schemas-microsoft-com:office:powerpoint" xmlns:com="http://schemas.openxmlformats.org/drawingml/2006/compatibility" xmlns:p14="http://schemas.microsoft.com/office/powerpoint/2010/main" xmlns:p15="http://schemas.microsoft.com/office/powerpoint/2012/main" xmlns:ahyp="http://schemas.microsoft.com/office/drawing/2018/hyperlinkcolor" show="0">
+<p:sld xmlns:a="http://schemas.openxmlformats.org/drawingml/2006/main" xmlns:r="http://schemas.openxmlformats.org/officeDocument/2006/relationships" xmlns:mc="http://schemas.openxmlformats.org/markup-compatibility/2006" xmlns:mv="urn:schemas-microsoft-com:mac:vml" xmlns:p="http://schemas.openxmlformats.org/presentationml/2006/main" xmlns:c="http://schemas.openxmlformats.org/drawingml/2006/chart" xmlns:dgm="http://schemas.openxmlformats.org/drawingml/2006/diagram" xmlns:o="urn:schemas-microsoft-com:office:office" xmlns:v="urn:schemas-microsoft-com:vml" xmlns:pvml="urn:schemas-microsoft-com:office:powerpoint" xmlns:com="http://schemas.openxmlformats.org/drawingml/2006/compatibility" xmlns:p14="http://schemas.microsoft.com/office/powerpoint/2010/main" xmlns:p15="http://schemas.microsoft.com/office/powerpoint/2012/main" xmlns:ahyp="http://schemas.microsoft.com/office/drawing/2018/hyperlinkcolor">
   <p:cSld>
     <p:spTree>
       <p:nvGrpSpPr>
-        <p:cNvPr id="197" name="Shape 197"/>
+        <p:cNvPr id="198" name="Shape 198"/>
         <p:cNvGrpSpPr/>
         <p:nvPr/>
       </p:nvGrpSpPr>
@@ -16234,387 +16116,7 @@
       </p:grpSpPr>
       <p:sp>
         <p:nvSpPr>
-          <p:cNvPr id="198" name="Google Shape;198;p37"/>
-          <p:cNvSpPr txBox="1"/>
-          <p:nvPr>
-            <p:ph type="title"/>
-          </p:nvPr>
-        </p:nvSpPr>
-        <p:spPr>
-          <a:xfrm>
-            <a:off x="311700" y="292625"/>
-            <a:ext cx="5110200" cy="572700"/>
-          </a:xfrm>
-          <a:prstGeom prst="rect">
-            <a:avLst/>
-          </a:prstGeom>
-          <a:noFill/>
-          <a:ln>
-            <a:noFill/>
-          </a:ln>
-        </p:spPr>
-        <p:txBody>
-          <a:bodyPr anchorCtr="0" anchor="t" bIns="91425" lIns="91425" spcFirstLastPara="1" rIns="91425" wrap="square" tIns="91425">
-            <a:normAutofit fontScale="90000"/>
-          </a:bodyPr>
-          <a:lstStyle/>
-          <a:p>
-            <a:pPr indent="0" lvl="0" marL="0" rtl="0" algn="l">
-              <a:lnSpc>
-                <a:spcPct val="100000"/>
-              </a:lnSpc>
-              <a:spcBef>
-                <a:spcPts val="0"/>
-              </a:spcBef>
-              <a:spcAft>
-                <a:spcPts val="0"/>
-              </a:spcAft>
-              <a:buSzPct val="111111"/>
-              <a:buNone/>
-            </a:pPr>
-            <a:r>
-              <a:rPr lang="en-GB">
-                <a:solidFill>
-                  <a:srgbClr val="EE0C90"/>
-                </a:solidFill>
-                <a:latin typeface="Audiowide"/>
-                <a:ea typeface="Audiowide"/>
-                <a:cs typeface="Audiowide"/>
-                <a:sym typeface="Audiowide"/>
-              </a:rPr>
-              <a:t>Title</a:t>
-            </a:r>
-            <a:endParaRPr>
-              <a:solidFill>
-                <a:srgbClr val="EE0C90"/>
-              </a:solidFill>
-              <a:latin typeface="Audiowide"/>
-              <a:ea typeface="Audiowide"/>
-              <a:cs typeface="Audiowide"/>
-              <a:sym typeface="Audiowide"/>
-            </a:endParaRPr>
-          </a:p>
-        </p:txBody>
-      </p:sp>
-      <p:sp>
-        <p:nvSpPr>
           <p:cNvPr id="199" name="Google Shape;199;p37"/>
-          <p:cNvSpPr/>
-          <p:nvPr/>
-        </p:nvSpPr>
-        <p:spPr>
-          <a:xfrm>
-            <a:off x="0" y="1000775"/>
-            <a:ext cx="9144000" cy="4142700"/>
-          </a:xfrm>
-          <a:prstGeom prst="rect">
-            <a:avLst/>
-          </a:prstGeom>
-          <a:solidFill>
-            <a:srgbClr val="2C0353"/>
-          </a:solidFill>
-          <a:ln cap="flat" cmpd="sng" w="9525">
-            <a:solidFill>
-              <a:srgbClr val="701C7F"/>
-            </a:solidFill>
-            <a:prstDash val="solid"/>
-            <a:round/>
-            <a:headEnd len="sm" w="sm" type="none"/>
-            <a:tailEnd len="sm" w="sm" type="none"/>
-          </a:ln>
-        </p:spPr>
-        <p:txBody>
-          <a:bodyPr anchorCtr="0" anchor="ctr" bIns="91425" lIns="91425" spcFirstLastPara="1" rIns="91425" wrap="square" tIns="91425">
-            <a:noAutofit/>
-          </a:bodyPr>
-          <a:lstStyle/>
-          <a:p>
-            <a:pPr indent="-487679" lvl="0" marL="499744" marR="5080" rtl="0" algn="l">
-              <a:lnSpc>
-                <a:spcPct val="116666"/>
-              </a:lnSpc>
-              <a:spcBef>
-                <a:spcPts val="0"/>
-              </a:spcBef>
-              <a:spcAft>
-                <a:spcPts val="0"/>
-              </a:spcAft>
-              <a:buClr>
-                <a:srgbClr val="000000"/>
-              </a:buClr>
-              <a:buSzPts val="1400"/>
-              <a:buFont typeface="Arial"/>
-              <a:buNone/>
-            </a:pPr>
-            <a:r>
-              <a:t/>
-            </a:r>
-            <a:endParaRPr b="0" i="0" sz="1400" u="none" cap="none" strike="noStrike">
-              <a:solidFill>
-                <a:srgbClr val="000000"/>
-              </a:solidFill>
-              <a:latin typeface="Arial"/>
-              <a:ea typeface="Arial"/>
-              <a:cs typeface="Arial"/>
-              <a:sym typeface="Arial"/>
-            </a:endParaRPr>
-          </a:p>
-        </p:txBody>
-      </p:sp>
-      <p:sp>
-        <p:nvSpPr>
-          <p:cNvPr id="200" name="Google Shape;200;p37"/>
-          <p:cNvSpPr txBox="1"/>
-          <p:nvPr/>
-        </p:nvSpPr>
-        <p:spPr>
-          <a:xfrm>
-            <a:off x="3066963" y="4671450"/>
-            <a:ext cx="5978700" cy="320700"/>
-          </a:xfrm>
-          <a:prstGeom prst="rect">
-            <a:avLst/>
-          </a:prstGeom>
-          <a:noFill/>
-          <a:ln>
-            <a:noFill/>
-          </a:ln>
-        </p:spPr>
-        <p:txBody>
-          <a:bodyPr anchorCtr="0" anchor="t" bIns="0" lIns="0" spcFirstLastPara="1" rIns="0" wrap="square" tIns="12700">
-            <a:spAutoFit/>
-          </a:bodyPr>
-          <a:lstStyle/>
-          <a:p>
-            <a:pPr indent="0" lvl="0" marL="12700" marR="0" rtl="0" algn="r">
-              <a:lnSpc>
-                <a:spcPct val="100000"/>
-              </a:lnSpc>
-              <a:spcBef>
-                <a:spcPts val="0"/>
-              </a:spcBef>
-              <a:spcAft>
-                <a:spcPts val="0"/>
-              </a:spcAft>
-              <a:buClr>
-                <a:srgbClr val="000000"/>
-              </a:buClr>
-              <a:buSzPts val="1000"/>
-              <a:buFont typeface="Arial"/>
-              <a:buNone/>
-            </a:pPr>
-            <a:r>
-              <a:rPr b="0" i="0" lang="en-GB" sz="1000" u="none" cap="none" strike="noStrike">
-                <a:solidFill>
-                  <a:srgbClr val="FFFFFF"/>
-                </a:solidFill>
-                <a:latin typeface="Roboto"/>
-                <a:ea typeface="Roboto"/>
-                <a:cs typeface="Roboto"/>
-                <a:sym typeface="Roboto"/>
-              </a:rPr>
-              <a:t>20-22 November, Karlsruhe, Germany</a:t>
-            </a:r>
-            <a:endParaRPr b="0" i="0" sz="1000" u="none" cap="none" strike="noStrike">
-              <a:solidFill>
-                <a:srgbClr val="FFFFFF"/>
-              </a:solidFill>
-              <a:latin typeface="Roboto"/>
-              <a:ea typeface="Roboto"/>
-              <a:cs typeface="Roboto"/>
-              <a:sym typeface="Roboto"/>
-            </a:endParaRPr>
-          </a:p>
-          <a:p>
-            <a:pPr indent="0" lvl="0" marL="12700" marR="0" rtl="0" algn="r">
-              <a:lnSpc>
-                <a:spcPct val="100000"/>
-              </a:lnSpc>
-              <a:spcBef>
-                <a:spcPts val="0"/>
-              </a:spcBef>
-              <a:spcAft>
-                <a:spcPts val="0"/>
-              </a:spcAft>
-              <a:buClr>
-                <a:srgbClr val="000000"/>
-              </a:buClr>
-              <a:buSzPts val="1000"/>
-              <a:buFont typeface="Arial"/>
-              <a:buNone/>
-            </a:pPr>
-            <a:r>
-              <a:rPr b="0" i="0" lang="en-GB" sz="1000" u="none" cap="none" strike="noStrike">
-                <a:solidFill>
-                  <a:srgbClr val="FFFFFF"/>
-                </a:solidFill>
-                <a:latin typeface="Roboto"/>
-                <a:ea typeface="Roboto"/>
-                <a:cs typeface="Roboto"/>
-                <a:sym typeface="Roboto"/>
-              </a:rPr>
-              <a:t>An Eclipse SDV Event</a:t>
-            </a:r>
-            <a:endParaRPr b="0" i="0" sz="1000" u="none" cap="none" strike="noStrike">
-              <a:solidFill>
-                <a:srgbClr val="FFFFFF"/>
-              </a:solidFill>
-              <a:latin typeface="Roboto"/>
-              <a:ea typeface="Roboto"/>
-              <a:cs typeface="Roboto"/>
-              <a:sym typeface="Roboto"/>
-            </a:endParaRPr>
-          </a:p>
-        </p:txBody>
-      </p:sp>
-      <p:sp>
-        <p:nvSpPr>
-          <p:cNvPr id="201" name="Google Shape;201;p37"/>
-          <p:cNvSpPr txBox="1"/>
-          <p:nvPr/>
-        </p:nvSpPr>
-        <p:spPr>
-          <a:xfrm>
-            <a:off x="383375" y="1324200"/>
-            <a:ext cx="7882500" cy="305400"/>
-          </a:xfrm>
-          <a:prstGeom prst="rect">
-            <a:avLst/>
-          </a:prstGeom>
-          <a:noFill/>
-          <a:ln>
-            <a:noFill/>
-          </a:ln>
-        </p:spPr>
-        <p:txBody>
-          <a:bodyPr anchorCtr="0" anchor="t" bIns="0" lIns="0" spcFirstLastPara="1" rIns="0" wrap="square" tIns="27925">
-            <a:spAutoFit/>
-          </a:bodyPr>
-          <a:lstStyle/>
-          <a:p>
-            <a:pPr indent="-487679" lvl="0" marL="499744" marR="5080" rtl="0" algn="l">
-              <a:lnSpc>
-                <a:spcPct val="116666"/>
-              </a:lnSpc>
-              <a:spcBef>
-                <a:spcPts val="0"/>
-              </a:spcBef>
-              <a:spcAft>
-                <a:spcPts val="0"/>
-              </a:spcAft>
-              <a:buClr>
-                <a:srgbClr val="000000"/>
-              </a:buClr>
-              <a:buSzPts val="1800"/>
-              <a:buFont typeface="Arial"/>
-              <a:buNone/>
-            </a:pPr>
-            <a:r>
-              <a:rPr b="0" i="0" lang="en-GB" sz="1800" u="none" cap="none" strike="noStrike">
-                <a:solidFill>
-                  <a:srgbClr val="FFFFFF"/>
-                </a:solidFill>
-                <a:latin typeface="Roboto"/>
-                <a:ea typeface="Roboto"/>
-                <a:cs typeface="Roboto"/>
-                <a:sym typeface="Roboto"/>
-              </a:rPr>
-              <a:t>Text</a:t>
-            </a:r>
-            <a:endParaRPr b="0" i="0" sz="1800" u="none" cap="none" strike="noStrike">
-              <a:solidFill>
-                <a:srgbClr val="FFFFFF"/>
-              </a:solidFill>
-              <a:latin typeface="Roboto"/>
-              <a:ea typeface="Roboto"/>
-              <a:cs typeface="Roboto"/>
-              <a:sym typeface="Roboto"/>
-            </a:endParaRPr>
-          </a:p>
-        </p:txBody>
-      </p:sp>
-      <p:pic>
-        <p:nvPicPr>
-          <p:cNvPr id="202" name="Google Shape;202;p37"/>
-          <p:cNvPicPr preferRelativeResize="0"/>
-          <p:nvPr/>
-        </p:nvPicPr>
-        <p:blipFill rotWithShape="1">
-          <a:blip r:embed="rId3">
-            <a:alphaModFix/>
-          </a:blip>
-          <a:srcRect b="0" l="0" r="0" t="0"/>
-          <a:stretch/>
-        </p:blipFill>
-        <p:spPr>
-          <a:xfrm>
-            <a:off x="8206850" y="224900"/>
-            <a:ext cx="708148" cy="708148"/>
-          </a:xfrm>
-          <a:prstGeom prst="rect">
-            <a:avLst/>
-          </a:prstGeom>
-          <a:noFill/>
-          <a:ln>
-            <a:noFill/>
-          </a:ln>
-        </p:spPr>
-      </p:pic>
-      <p:pic>
-        <p:nvPicPr>
-          <p:cNvPr id="203" name="Google Shape;203;p37"/>
-          <p:cNvPicPr preferRelativeResize="0"/>
-          <p:nvPr/>
-        </p:nvPicPr>
-        <p:blipFill rotWithShape="1">
-          <a:blip r:embed="rId4">
-            <a:alphaModFix/>
-          </a:blip>
-          <a:srcRect b="0" l="0" r="0" t="0"/>
-          <a:stretch/>
-        </p:blipFill>
-        <p:spPr>
-          <a:xfrm>
-            <a:off x="6770075" y="376224"/>
-            <a:ext cx="1166397" cy="405500"/>
-          </a:xfrm>
-          <a:prstGeom prst="rect">
-            <a:avLst/>
-          </a:prstGeom>
-          <a:noFill/>
-          <a:ln>
-            <a:noFill/>
-          </a:ln>
-        </p:spPr>
-      </p:pic>
-    </p:spTree>
-  </p:cSld>
-  <p:clrMapOvr>
-    <a:masterClrMapping/>
-  </p:clrMapOvr>
-</p:sld>
-</file>
-
-<file path=ppt/slides/slide14.xml><?xml version="1.0" encoding="utf-8"?>
-<p:sld xmlns:a="http://schemas.openxmlformats.org/drawingml/2006/main" xmlns:r="http://schemas.openxmlformats.org/officeDocument/2006/relationships" xmlns:mc="http://schemas.openxmlformats.org/markup-compatibility/2006" xmlns:mv="urn:schemas-microsoft-com:mac:vml" xmlns:p="http://schemas.openxmlformats.org/presentationml/2006/main" xmlns:c="http://schemas.openxmlformats.org/drawingml/2006/chart" xmlns:dgm="http://schemas.openxmlformats.org/drawingml/2006/diagram" xmlns:o="urn:schemas-microsoft-com:office:office" xmlns:v="urn:schemas-microsoft-com:vml" xmlns:pvml="urn:schemas-microsoft-com:office:powerpoint" xmlns:com="http://schemas.openxmlformats.org/drawingml/2006/compatibility" xmlns:p14="http://schemas.microsoft.com/office/powerpoint/2010/main" xmlns:p15="http://schemas.microsoft.com/office/powerpoint/2012/main" xmlns:ahyp="http://schemas.microsoft.com/office/drawing/2018/hyperlinkcolor">
-  <p:cSld>
-    <p:spTree>
-      <p:nvGrpSpPr>
-        <p:cNvPr id="207" name="Shape 207"/>
-        <p:cNvGrpSpPr/>
-        <p:nvPr/>
-      </p:nvGrpSpPr>
-      <p:grpSpPr>
-        <a:xfrm>
-          <a:off x="0" y="0"/>
-          <a:ext cx="0" cy="0"/>
-          <a:chOff x="0" y="0"/>
-          <a:chExt cx="0" cy="0"/>
-        </a:xfrm>
-      </p:grpSpPr>
-      <p:sp>
-        <p:nvSpPr>
-          <p:cNvPr id="208" name="Google Shape;208;p38"/>
           <p:cNvSpPr txBox="1"/>
           <p:nvPr>
             <p:ph type="title"/>
@@ -16678,7 +16180,7 @@
       </p:sp>
       <p:sp>
         <p:nvSpPr>
-          <p:cNvPr id="209" name="Google Shape;209;p38"/>
+          <p:cNvPr id="200" name="Google Shape;200;p37"/>
           <p:cNvSpPr/>
           <p:nvPr/>
         </p:nvSpPr>
@@ -16749,12 +16251,12 @@
 </p:sld>
 </file>
 
-<file path=ppt/slides/slide15.xml><?xml version="1.0" encoding="utf-8"?>
+<file path=ppt/slides/slide14.xml><?xml version="1.0" encoding="utf-8"?>
 <p:sld xmlns:a="http://schemas.openxmlformats.org/drawingml/2006/main" xmlns:r="http://schemas.openxmlformats.org/officeDocument/2006/relationships" xmlns:mc="http://schemas.openxmlformats.org/markup-compatibility/2006" xmlns:mv="urn:schemas-microsoft-com:mac:vml" xmlns:p="http://schemas.openxmlformats.org/presentationml/2006/main" xmlns:c="http://schemas.openxmlformats.org/drawingml/2006/chart" xmlns:dgm="http://schemas.openxmlformats.org/drawingml/2006/diagram" xmlns:o="urn:schemas-microsoft-com:office:office" xmlns:v="urn:schemas-microsoft-com:vml" xmlns:pvml="urn:schemas-microsoft-com:office:powerpoint" xmlns:com="http://schemas.openxmlformats.org/drawingml/2006/compatibility" xmlns:p14="http://schemas.microsoft.com/office/powerpoint/2010/main" xmlns:p15="http://schemas.microsoft.com/office/powerpoint/2012/main" xmlns:ahyp="http://schemas.microsoft.com/office/drawing/2018/hyperlinkcolor">
   <p:cSld>
     <p:spTree>
       <p:nvGrpSpPr>
-        <p:cNvPr id="213" name="Shape 213"/>
+        <p:cNvPr id="204" name="Shape 204"/>
         <p:cNvGrpSpPr/>
         <p:nvPr/>
       </p:nvGrpSpPr>
@@ -16768,7 +16270,7 @@
       </p:grpSpPr>
       <p:sp>
         <p:nvSpPr>
-          <p:cNvPr id="214" name="Google Shape;214;p39"/>
+          <p:cNvPr id="205" name="Google Shape;205;p38"/>
           <p:cNvSpPr/>
           <p:nvPr/>
         </p:nvSpPr>
@@ -16833,7 +16335,7 @@
       </p:sp>
       <p:sp>
         <p:nvSpPr>
-          <p:cNvPr id="215" name="Google Shape;215;p39"/>
+          <p:cNvPr id="206" name="Google Shape;206;p38"/>
           <p:cNvSpPr txBox="1"/>
           <p:nvPr/>
         </p:nvSpPr>
@@ -16939,7 +16441,7 @@
       </p:sp>
       <p:sp>
         <p:nvSpPr>
-          <p:cNvPr id="216" name="Google Shape;216;p39"/>
+          <p:cNvPr id="207" name="Google Shape;207;p38"/>
           <p:cNvSpPr txBox="1"/>
           <p:nvPr/>
         </p:nvSpPr>
@@ -17005,7 +16507,7 @@
       </p:sp>
       <p:pic>
         <p:nvPicPr>
-          <p:cNvPr id="217" name="Google Shape;217;p39"/>
+          <p:cNvPr id="208" name="Google Shape;208;p38"/>
           <p:cNvPicPr preferRelativeResize="0"/>
           <p:nvPr/>
         </p:nvPicPr>
@@ -17032,7 +16534,7 @@
       </p:pic>
       <p:pic>
         <p:nvPicPr>
-          <p:cNvPr id="218" name="Google Shape;218;p39"/>
+          <p:cNvPr id="209" name="Google Shape;209;p38"/>
           <p:cNvPicPr preferRelativeResize="0"/>
           <p:nvPr/>
         </p:nvPicPr>
@@ -17059,7 +16561,7 @@
       </p:pic>
       <p:sp>
         <p:nvSpPr>
-          <p:cNvPr id="219" name="Google Shape;219;p39"/>
+          <p:cNvPr id="210" name="Google Shape;210;p38"/>
           <p:cNvSpPr txBox="1"/>
           <p:nvPr/>
         </p:nvSpPr>
@@ -19597,11 +19099,124 @@
           </a:p>
         </p:txBody>
       </p:sp>
+      <p:pic>
+        <p:nvPicPr>
+          <p:cNvPr id="159" name="Google Shape;159;p32" title="reports_dashboard_pitch.mp4">
+            <a:hlinkClick r:id="rId3"/>
+          </p:cNvPr>
+          <p:cNvPicPr preferRelativeResize="0"/>
+          <p:nvPr/>
+        </p:nvPicPr>
+        <p:blipFill>
+          <a:blip r:embed="rId4">
+            <a:alphaModFix/>
+          </a:blip>
+          <a:stretch>
+            <a:fillRect/>
+          </a:stretch>
+        </p:blipFill>
+        <p:spPr>
+          <a:xfrm>
+            <a:off x="830413" y="967475"/>
+            <a:ext cx="7483176" cy="4209300"/>
+          </a:xfrm>
+          <a:prstGeom prst="rect">
+            <a:avLst/>
+          </a:prstGeom>
+          <a:noFill/>
+          <a:ln>
+            <a:noFill/>
+          </a:ln>
+        </p:spPr>
+      </p:pic>
     </p:spTree>
   </p:cSld>
   <p:clrMapOvr>
     <a:masterClrMapping/>
   </p:clrMapOvr>
+  <p:timing>
+    <p:tnLst>
+      <p:par>
+        <p:cTn dur="indefinite" nodeType="tmRoot" restart="never">
+          <p:childTnLst>
+            <p:seq concurrent="1" nextAc="seek">
+              <p:cTn dur="indefinite" id="2" nodeType="mainSeq">
+                <p:childTnLst>
+                  <p:par>
+                    <p:cTn fill="hold">
+                      <p:stCondLst>
+                        <p:cond delay="indefinite"/>
+                      </p:stCondLst>
+                      <p:childTnLst>
+                        <p:par>
+                          <p:cTn fill="hold">
+                            <p:stCondLst>
+                              <p:cond delay="0"/>
+                            </p:stCondLst>
+                            <p:childTnLst>
+                              <p:par>
+                                <p:cTn fill="hold" nodeType="clickEffect" presetClass="entr" presetID="10" presetSubtype="0">
+                                  <p:stCondLst>
+                                    <p:cond delay="0"/>
+                                  </p:stCondLst>
+                                  <p:childTnLst>
+                                    <p:set>
+                                      <p:cBhvr>
+                                        <p:cTn dur="1" fill="hold">
+                                          <p:stCondLst>
+                                            <p:cond delay="0"/>
+                                          </p:stCondLst>
+                                        </p:cTn>
+                                        <p:tgtEl>
+                                          <p:spTgt spid="159"/>
+                                        </p:tgtEl>
+                                        <p:attrNameLst>
+                                          <p:attrName>style.visibility</p:attrName>
+                                        </p:attrNameLst>
+                                      </p:cBhvr>
+                                      <p:to>
+                                        <p:strVal val="visible"/>
+                                      </p:to>
+                                    </p:set>
+                                    <p:animEffect filter="fade" transition="in">
+                                      <p:cBhvr>
+                                        <p:cTn dur="1000"/>
+                                        <p:tgtEl>
+                                          <p:spTgt spid="159"/>
+                                        </p:tgtEl>
+                                      </p:cBhvr>
+                                    </p:animEffect>
+                                  </p:childTnLst>
+                                </p:cTn>
+                              </p:par>
+                            </p:childTnLst>
+                          </p:cTn>
+                        </p:par>
+                      </p:childTnLst>
+                    </p:cTn>
+                  </p:par>
+                </p:childTnLst>
+              </p:cTn>
+              <p:prevCondLst>
+                <p:cond evt="onPrev">
+                  <p:tgtEl>
+                    <p:sldTgt/>
+                  </p:tgtEl>
+                </p:cond>
+              </p:prevCondLst>
+              <p:nextCondLst>
+                <p:cond evt="onNext">
+                  <p:tgtEl>
+                    <p:sldTgt/>
+                  </p:tgtEl>
+                </p:cond>
+              </p:nextCondLst>
+            </p:seq>
+          </p:childTnLst>
+        </p:cTn>
+      </p:par>
+    </p:tnLst>
+  </p:timing>
 </p:sld>
 </file>
 
@@ -19610,7 +19225,7 @@
   <p:cSld>
     <p:spTree>
       <p:nvGrpSpPr>
-        <p:cNvPr id="162" name="Shape 162"/>
+        <p:cNvPr id="163" name="Shape 163"/>
         <p:cNvGrpSpPr/>
         <p:nvPr/>
       </p:nvGrpSpPr>
@@ -19624,7 +19239,7 @@
       </p:grpSpPr>
       <p:sp>
         <p:nvSpPr>
-          <p:cNvPr id="163" name="Google Shape;163;p33"/>
+          <p:cNvPr id="164" name="Google Shape;164;p33"/>
           <p:cNvSpPr txBox="1"/>
           <p:nvPr>
             <p:ph type="title"/>
@@ -19688,7 +19303,7 @@
       </p:sp>
       <p:sp>
         <p:nvSpPr>
-          <p:cNvPr id="164" name="Google Shape;164;p33"/>
+          <p:cNvPr id="165" name="Google Shape;165;p33"/>
           <p:cNvSpPr/>
           <p:nvPr/>
         </p:nvSpPr>
@@ -19753,7 +19368,7 @@
       </p:sp>
       <p:sp>
         <p:nvSpPr>
-          <p:cNvPr id="165" name="Google Shape;165;p33"/>
+          <p:cNvPr id="166" name="Google Shape;166;p33"/>
           <p:cNvSpPr txBox="1"/>
           <p:nvPr/>
         </p:nvSpPr>
@@ -19814,7 +19429,7 @@
       </p:sp>
       <p:pic>
         <p:nvPicPr>
-          <p:cNvPr id="166" name="Google Shape;166;p33"/>
+          <p:cNvPr id="167" name="Google Shape;167;p33"/>
           <p:cNvPicPr preferRelativeResize="0"/>
           <p:nvPr/>
         </p:nvPicPr>
@@ -19857,9 +19472,9 @@
 </file>
 
 <file path=ppt/theme/theme1.xml><?xml version="1.0" encoding="utf-8"?>
-<a:theme xmlns:a="http://schemas.openxmlformats.org/drawingml/2006/main" xmlns:r="http://schemas.openxmlformats.org/officeDocument/2006/relationships">
+<a:theme xmlns:a="http://schemas.openxmlformats.org/drawingml/2006/main" xmlns:r="http://schemas.openxmlformats.org/officeDocument/2006/relationships" name="Simple Light">
   <a:themeElements>
-    <a:clrScheme name="Default">
+    <a:clrScheme name="Simple Light">
       <a:dk1>
         <a:srgbClr val="000000"/>
       </a:dk1>
@@ -19867,34 +19482,34 @@
         <a:srgbClr val="FFFFFF"/>
       </a:lt1>
       <a:dk2>
-        <a:srgbClr val="158158"/>
+        <a:srgbClr val="595959"/>
       </a:dk2>
       <a:lt2>
-        <a:srgbClr val="F3F3F3"/>
+        <a:srgbClr val="EEEEEE"/>
       </a:lt2>
       <a:accent1>
-        <a:srgbClr val="058DC7"/>
+        <a:srgbClr val="4285F4"/>
       </a:accent1>
       <a:accent2>
-        <a:srgbClr val="50B432"/>
+        <a:srgbClr val="212121"/>
       </a:accent2>
       <a:accent3>
-        <a:srgbClr val="ED561B"/>
+        <a:srgbClr val="78909C"/>
       </a:accent3>
       <a:accent4>
-        <a:srgbClr val="EDEF00"/>
+        <a:srgbClr val="FFAB40"/>
       </a:accent4>
       <a:accent5>
-        <a:srgbClr val="24CBE5"/>
+        <a:srgbClr val="0097A7"/>
       </a:accent5>
       <a:accent6>
-        <a:srgbClr val="64E572"/>
+        <a:srgbClr val="EEFF41"/>
       </a:accent6>
       <a:hlink>
-        <a:srgbClr val="2200CC"/>
+        <a:srgbClr val="0097A7"/>
       </a:hlink>
       <a:folHlink>
-        <a:srgbClr val="551A8B"/>
+        <a:srgbClr val="0097A7"/>
       </a:folHlink>
     </a:clrScheme>
     <a:fontScheme name="Office">
@@ -20415,9 +20030,9 @@
 </file>
 
 <file path=ppt/theme/theme3.xml><?xml version="1.0" encoding="utf-8"?>
-<a:theme xmlns:a="http://schemas.openxmlformats.org/drawingml/2006/main" xmlns:r="http://schemas.openxmlformats.org/officeDocument/2006/relationships" name="Simple Light">
+<a:theme xmlns:a="http://schemas.openxmlformats.org/drawingml/2006/main" xmlns:r="http://schemas.openxmlformats.org/officeDocument/2006/relationships">
   <a:themeElements>
-    <a:clrScheme name="Simple Light">
+    <a:clrScheme name="Default">
       <a:dk1>
         <a:srgbClr val="000000"/>
       </a:dk1>
@@ -20425,34 +20040,34 @@
         <a:srgbClr val="FFFFFF"/>
       </a:lt1>
       <a:dk2>
-        <a:srgbClr val="595959"/>
+        <a:srgbClr val="158158"/>
       </a:dk2>
       <a:lt2>
-        <a:srgbClr val="EEEEEE"/>
+        <a:srgbClr val="F3F3F3"/>
       </a:lt2>
       <a:accent1>
-        <a:srgbClr val="4285F4"/>
+        <a:srgbClr val="058DC7"/>
       </a:accent1>
       <a:accent2>
-        <a:srgbClr val="212121"/>
+        <a:srgbClr val="50B432"/>
       </a:accent2>
       <a:accent3>
-        <a:srgbClr val="78909C"/>
+        <a:srgbClr val="ED561B"/>
       </a:accent3>
       <a:accent4>
-        <a:srgbClr val="FFAB40"/>
+        <a:srgbClr val="EDEF00"/>
       </a:accent4>
       <a:accent5>
-        <a:srgbClr val="0097A7"/>
+        <a:srgbClr val="24CBE5"/>
       </a:accent5>
       <a:accent6>
-        <a:srgbClr val="EEFF41"/>
+        <a:srgbClr val="64E572"/>
       </a:accent6>
       <a:hlink>
-        <a:srgbClr val="0097A7"/>
+        <a:srgbClr val="2200CC"/>
       </a:hlink>
       <a:folHlink>
-        <a:srgbClr val="0097A7"/>
+        <a:srgbClr val="551A8B"/>
       </a:folHlink>
     </a:clrScheme>
     <a:fontScheme name="Office">

</xml_diff>